<commit_message>
Small changes after speaking with Nick
</commit_message>
<xml_diff>
--- a/Presentations/DevMeeting20120208_stablemaster.pptx
+++ b/Presentations/DevMeeting20120208_stablemaster.pptx
@@ -17,10 +17,12 @@
     <p:sldId id="267" r:id="rId11"/>
     <p:sldId id="269" r:id="rId12"/>
     <p:sldId id="268" r:id="rId13"/>
-    <p:sldId id="270" r:id="rId14"/>
-    <p:sldId id="271" r:id="rId15"/>
-    <p:sldId id="263" r:id="rId16"/>
-    <p:sldId id="257" r:id="rId17"/>
+    <p:sldId id="272" r:id="rId14"/>
+    <p:sldId id="273" r:id="rId15"/>
+    <p:sldId id="270" r:id="rId16"/>
+    <p:sldId id="271" r:id="rId17"/>
+    <p:sldId id="263" r:id="rId18"/>
+    <p:sldId id="257" r:id="rId19"/>
   </p:sldIdLst>
   <p:sldSz cx="9144000" cy="6858000" type="screen4x3"/>
   <p:notesSz cx="6858000" cy="9144000"/>
@@ -3532,8 +3534,13 @@
           <a:p>
             <a:r>
               <a:rPr lang="en-US" dirty="0" smtClean="0"/>
-              <a:t>Duplicate incremental (and clean?) builds for “next” branch</a:t>
-            </a:r>
+              <a:t>Duplicate incremental (and clean?) builds for </a:t>
+            </a:r>
+            <a:r>
+              <a:rPr lang="en-US" dirty="0" smtClean="0"/>
+              <a:t>integration branch</a:t>
+            </a:r>
+            <a:endParaRPr lang="en-US" dirty="0" smtClean="0"/>
           </a:p>
           <a:p>
             <a:r>
@@ -3546,21 +3553,25 @@
             </a:r>
             <a:r>
               <a:rPr lang="en-US" dirty="0" smtClean="0"/>
-              <a:t> is the result of successful “next”</a:t>
-            </a:r>
-          </a:p>
-          <a:p>
-            <a:r>
-              <a:rPr lang="en-US" dirty="0" err="1"/>
-              <a:t>m</a:t>
-            </a:r>
+              <a:t> is the result of successful </a:t>
+            </a:r>
+            <a:r>
+              <a:rPr lang="en-US" dirty="0" smtClean="0"/>
+              <a:t>integration</a:t>
+            </a:r>
+          </a:p>
+          <a:p>
             <a:r>
               <a:rPr lang="en-US" dirty="0" err="1" smtClean="0"/>
-              <a:t>antidnightly</a:t>
-            </a:r>
-            <a:r>
-              <a:rPr lang="en-US" dirty="0" smtClean="0"/>
-              <a:t> is the result of successful “master” build </a:t>
+              <a:t>mantidnightly</a:t>
+            </a:r>
+            <a:r>
+              <a:rPr lang="en-US" dirty="0" smtClean="0"/>
+              <a:t> </a:t>
+            </a:r>
+            <a:r>
+              <a:rPr lang="en-US" dirty="0" smtClean="0"/>
+              <a:t>is the result of successful “master” build </a:t>
             </a:r>
             <a:endParaRPr lang="en-US" dirty="0"/>
           </a:p>
@@ -3613,7 +3624,15 @@
           <a:p>
             <a:r>
               <a:rPr lang="en-US" dirty="0" smtClean="0"/>
-              <a:t>Extra benefits</a:t>
+              <a:t>Test throughout </a:t>
+            </a:r>
+            <a:r>
+              <a:rPr lang="en-US" dirty="0" err="1" smtClean="0"/>
+              <a:t>dev</a:t>
+            </a:r>
+            <a:r>
+              <a:rPr lang="en-US" dirty="0" smtClean="0"/>
+              <a:t> cycle</a:t>
             </a:r>
             <a:endParaRPr lang="en-US" dirty="0"/>
           </a:p>
@@ -3634,21 +3653,53 @@
           <a:bodyPr/>
           <a:lstStyle/>
           <a:p>
-            <a:r>
-              <a:rPr lang="en-US" dirty="0" smtClean="0"/>
-              <a:t>All builds of “master” are releasable – just add unscripted testing and a version number</a:t>
-            </a:r>
-          </a:p>
-          <a:p>
-            <a:r>
-              <a:rPr lang="en-US" dirty="0" smtClean="0"/>
-              <a:t>Patch releases require (almost) no extra review</a:t>
-            </a:r>
-          </a:p>
-          <a:p>
-            <a:r>
-              <a:rPr lang="en-US" dirty="0" smtClean="0"/>
-              <a:t>Only “fully baked” features are in a release</a:t>
+            <a:pPr marL="0" indent="0">
+              <a:buNone/>
+            </a:pPr>
+            <a:r>
+              <a:rPr lang="en-US" dirty="0" smtClean="0"/>
+              <a:t>Currently:</a:t>
+            </a:r>
+          </a:p>
+          <a:p>
+            <a:r>
+              <a:rPr lang="en-US" dirty="0" smtClean="0"/>
+              <a:t>7 weeks development</a:t>
+            </a:r>
+          </a:p>
+          <a:p>
+            <a:r>
+              <a:rPr lang="en-US" dirty="0"/>
+              <a:t>2</a:t>
+            </a:r>
+            <a:r>
+              <a:rPr lang="en-US" dirty="0" smtClean="0"/>
+              <a:t> days testing</a:t>
+            </a:r>
+          </a:p>
+          <a:p>
+            <a:r>
+              <a:rPr lang="en-US" dirty="0"/>
+              <a:t>3</a:t>
+            </a:r>
+            <a:r>
+              <a:rPr lang="en-US" dirty="0" smtClean="0"/>
+              <a:t> days hoping nobody notices you aren’t testing</a:t>
+            </a:r>
+          </a:p>
+          <a:p>
+            <a:pPr marL="0" indent="0">
+              <a:buNone/>
+            </a:pPr>
+            <a:r>
+              <a:rPr lang="en-US" dirty="0" smtClean="0"/>
+              <a:t>Future:</a:t>
+            </a:r>
+          </a:p>
+          <a:p>
+            <a:r>
+              <a:rPr lang="en-US" dirty="0" smtClean="0"/>
+              <a:t>8 weeks development with testing throughout</a:t>
             </a:r>
           </a:p>
         </p:txBody>
@@ -3656,7 +3707,7 @@
     </p:spTree>
     <p:extLst>
       <p:ext uri="{BB962C8B-B14F-4D97-AF65-F5344CB8AC3E}">
-        <p14:creationId xmlns:p14="http://schemas.microsoft.com/office/powerpoint/2010/main" val="2875966241"/>
+        <p14:creationId xmlns:p14="http://schemas.microsoft.com/office/powerpoint/2010/main" val="2350806236"/>
       </p:ext>
     </p:extLst>
   </p:cSld>
@@ -3700,7 +3751,7 @@
           <a:p>
             <a:r>
               <a:rPr lang="en-US" dirty="0" smtClean="0"/>
-              <a:t>Problems</a:t>
+              <a:t>Possibilities for testing</a:t>
             </a:r>
             <a:endParaRPr lang="en-US" dirty="0"/>
           </a:p>
@@ -3723,40 +3774,33 @@
           <a:p>
             <a:r>
               <a:rPr lang="en-US" dirty="0" smtClean="0"/>
-              <a:t>Ticket </a:t>
-            </a:r>
-            <a:r>
-              <a:rPr lang="en-US" dirty="0" err="1" smtClean="0"/>
-              <a:t>cruft</a:t>
-            </a:r>
-            <a:r>
-              <a:rPr lang="en-US" dirty="0" smtClean="0"/>
-              <a:t> in </a:t>
-            </a:r>
-            <a:r>
-              <a:rPr lang="en-US" dirty="0" err="1" smtClean="0"/>
-              <a:t>trac</a:t>
-            </a:r>
-            <a:endParaRPr lang="en-US" dirty="0" smtClean="0"/>
-          </a:p>
-          <a:p>
-            <a:pPr lvl="1"/>
-            <a:r>
-              <a:rPr lang="en-US" dirty="0" smtClean="0"/>
-              <a:t>Merge emails</a:t>
-            </a:r>
-          </a:p>
-          <a:p>
-            <a:pPr lvl="1"/>
-            <a:r>
-              <a:rPr lang="en-US" dirty="0" smtClean="0"/>
-              <a:t>Broken change set links in tickets</a:t>
-            </a:r>
-          </a:p>
-          <a:p>
-            <a:r>
-              <a:rPr lang="en-US" dirty="0" smtClean="0"/>
-              <a:t>Educating people in new workflow</a:t>
+              <a:t>Close a ticket, verify a ticket</a:t>
+            </a:r>
+          </a:p>
+          <a:p>
+            <a:r>
+              <a:rPr lang="en-US" dirty="0" smtClean="0"/>
+              <a:t>Testing </a:t>
+            </a:r>
+            <a:r>
+              <a:rPr lang="en-US" dirty="0"/>
+              <a:t>F</a:t>
+            </a:r>
+            <a:r>
+              <a:rPr lang="en-US" dirty="0" smtClean="0"/>
+              <a:t>ridays (5 days of testing increases to 8 days)</a:t>
+            </a:r>
+          </a:p>
+          <a:p>
+            <a:r>
+              <a:rPr lang="en-US" dirty="0" smtClean="0"/>
+              <a:t>Look for testing tickets first/last thing every day</a:t>
+            </a:r>
+          </a:p>
+          <a:p>
+            <a:r>
+              <a:rPr lang="en-US" dirty="0" smtClean="0"/>
+              <a:t>Change the development culture to test more often</a:t>
             </a:r>
             <a:endParaRPr lang="en-US" dirty="0"/>
           </a:p>
@@ -3765,7 +3809,7 @@
     </p:spTree>
     <p:extLst>
       <p:ext uri="{BB962C8B-B14F-4D97-AF65-F5344CB8AC3E}">
-        <p14:creationId xmlns:p14="http://schemas.microsoft.com/office/powerpoint/2010/main" val="1499593529"/>
+        <p14:creationId xmlns:p14="http://schemas.microsoft.com/office/powerpoint/2010/main" val="231521776"/>
       </p:ext>
     </p:extLst>
   </p:cSld>
@@ -3809,6 +3853,224 @@
           <a:p>
             <a:r>
               <a:rPr lang="en-US" dirty="0" smtClean="0"/>
+              <a:t>Extra benefits</a:t>
+            </a:r>
+            <a:endParaRPr lang="en-US" dirty="0"/>
+          </a:p>
+        </p:txBody>
+      </p:sp>
+      <p:sp>
+        <p:nvSpPr>
+          <p:cNvPr id="3" name="Content Placeholder 2"/>
+          <p:cNvSpPr>
+            <a:spLocks noGrp="1"/>
+          </p:cNvSpPr>
+          <p:nvPr>
+            <p:ph idx="1"/>
+          </p:nvPr>
+        </p:nvSpPr>
+        <p:spPr/>
+        <p:txBody>
+          <a:bodyPr/>
+          <a:lstStyle/>
+          <a:p>
+            <a:r>
+              <a:rPr lang="en-US" dirty="0" smtClean="0"/>
+              <a:t>All builds of “master” are releasable – just add unscripted testing and a version number</a:t>
+            </a:r>
+          </a:p>
+          <a:p>
+            <a:r>
+              <a:rPr lang="en-US" dirty="0" smtClean="0"/>
+              <a:t>Patch releases require (almost) no extra review</a:t>
+            </a:r>
+          </a:p>
+          <a:p>
+            <a:r>
+              <a:rPr lang="en-US" dirty="0" smtClean="0"/>
+              <a:t>Only “fully baked” features are in a release</a:t>
+            </a:r>
+          </a:p>
+        </p:txBody>
+      </p:sp>
+    </p:spTree>
+    <p:extLst>
+      <p:ext uri="{BB962C8B-B14F-4D97-AF65-F5344CB8AC3E}">
+        <p14:creationId xmlns:p14="http://schemas.microsoft.com/office/powerpoint/2010/main" val="2875966241"/>
+      </p:ext>
+    </p:extLst>
+  </p:cSld>
+  <p:clrMapOvr>
+    <a:masterClrMapping/>
+  </p:clrMapOvr>
+</p:sld>
+</file>
+
+<file path=ppt/slides/slide16.xml><?xml version="1.0" encoding="utf-8"?>
+<p:sld xmlns:a="http://schemas.openxmlformats.org/drawingml/2006/main" xmlns:r="http://schemas.openxmlformats.org/officeDocument/2006/relationships" xmlns:p="http://schemas.openxmlformats.org/presentationml/2006/main">
+  <p:cSld>
+    <p:spTree>
+      <p:nvGrpSpPr>
+        <p:cNvPr id="1" name=""/>
+        <p:cNvGrpSpPr/>
+        <p:nvPr/>
+      </p:nvGrpSpPr>
+      <p:grpSpPr>
+        <a:xfrm>
+          <a:off x="0" y="0"/>
+          <a:ext cx="0" cy="0"/>
+          <a:chOff x="0" y="0"/>
+          <a:chExt cx="0" cy="0"/>
+        </a:xfrm>
+      </p:grpSpPr>
+      <p:sp>
+        <p:nvSpPr>
+          <p:cNvPr id="2" name="Title 1"/>
+          <p:cNvSpPr>
+            <a:spLocks noGrp="1"/>
+          </p:cNvSpPr>
+          <p:nvPr>
+            <p:ph type="title"/>
+          </p:nvPr>
+        </p:nvSpPr>
+        <p:spPr/>
+        <p:txBody>
+          <a:bodyPr/>
+          <a:lstStyle/>
+          <a:p>
+            <a:r>
+              <a:rPr lang="en-US" dirty="0" smtClean="0"/>
+              <a:t>Problems</a:t>
+            </a:r>
+            <a:endParaRPr lang="en-US" dirty="0"/>
+          </a:p>
+        </p:txBody>
+      </p:sp>
+      <p:sp>
+        <p:nvSpPr>
+          <p:cNvPr id="3" name="Content Placeholder 2"/>
+          <p:cNvSpPr>
+            <a:spLocks noGrp="1"/>
+          </p:cNvSpPr>
+          <p:nvPr>
+            <p:ph idx="1"/>
+          </p:nvPr>
+        </p:nvSpPr>
+        <p:spPr/>
+        <p:txBody>
+          <a:bodyPr/>
+          <a:lstStyle/>
+          <a:p>
+            <a:r>
+              <a:rPr lang="en-US" dirty="0" smtClean="0"/>
+              <a:t>Ticket </a:t>
+            </a:r>
+            <a:r>
+              <a:rPr lang="en-US" dirty="0" err="1" smtClean="0"/>
+              <a:t>cruft</a:t>
+            </a:r>
+            <a:r>
+              <a:rPr lang="en-US" dirty="0" smtClean="0"/>
+              <a:t> in </a:t>
+            </a:r>
+            <a:r>
+              <a:rPr lang="en-US" dirty="0" err="1" smtClean="0"/>
+              <a:t>trac</a:t>
+            </a:r>
+            <a:endParaRPr lang="en-US" dirty="0" smtClean="0"/>
+          </a:p>
+          <a:p>
+            <a:pPr lvl="1"/>
+            <a:r>
+              <a:rPr lang="en-US" dirty="0" smtClean="0"/>
+              <a:t>Merge emails</a:t>
+            </a:r>
+          </a:p>
+          <a:p>
+            <a:pPr lvl="1"/>
+            <a:r>
+              <a:rPr lang="en-US" dirty="0" smtClean="0"/>
+              <a:t>Broken change set links in tickets</a:t>
+            </a:r>
+          </a:p>
+          <a:p>
+            <a:r>
+              <a:rPr lang="en-US" dirty="0" smtClean="0"/>
+              <a:t>Educating people in new </a:t>
+            </a:r>
+            <a:r>
+              <a:rPr lang="en-US" dirty="0" smtClean="0"/>
+              <a:t>workflow</a:t>
+            </a:r>
+          </a:p>
+          <a:p>
+            <a:r>
+              <a:rPr lang="en-US" dirty="0" smtClean="0"/>
+              <a:t>Is code merged into master only after verification by the tester</a:t>
+            </a:r>
+            <a:r>
+              <a:rPr lang="en-US" dirty="0"/>
+              <a:t> </a:t>
+            </a:r>
+            <a:r>
+              <a:rPr lang="en-US" dirty="0" smtClean="0"/>
+              <a:t>or </a:t>
+            </a:r>
+            <a:r>
+              <a:rPr lang="en-US" dirty="0" smtClean="0"/>
+              <a:t>gatekeepers?</a:t>
+            </a:r>
+            <a:endParaRPr lang="en-US" dirty="0"/>
+          </a:p>
+        </p:txBody>
+      </p:sp>
+    </p:spTree>
+    <p:extLst>
+      <p:ext uri="{BB962C8B-B14F-4D97-AF65-F5344CB8AC3E}">
+        <p14:creationId xmlns:p14="http://schemas.microsoft.com/office/powerpoint/2010/main" val="1499593529"/>
+      </p:ext>
+    </p:extLst>
+  </p:cSld>
+  <p:clrMapOvr>
+    <a:masterClrMapping/>
+  </p:clrMapOvr>
+</p:sld>
+</file>
+
+<file path=ppt/slides/slide17.xml><?xml version="1.0" encoding="utf-8"?>
+<p:sld xmlns:a="http://schemas.openxmlformats.org/drawingml/2006/main" xmlns:r="http://schemas.openxmlformats.org/officeDocument/2006/relationships" xmlns:p="http://schemas.openxmlformats.org/presentationml/2006/main">
+  <p:cSld>
+    <p:spTree>
+      <p:nvGrpSpPr>
+        <p:cNvPr id="1" name=""/>
+        <p:cNvGrpSpPr/>
+        <p:nvPr/>
+      </p:nvGrpSpPr>
+      <p:grpSpPr>
+        <a:xfrm>
+          <a:off x="0" y="0"/>
+          <a:ext cx="0" cy="0"/>
+          <a:chOff x="0" y="0"/>
+          <a:chExt cx="0" cy="0"/>
+        </a:xfrm>
+      </p:grpSpPr>
+      <p:sp>
+        <p:nvSpPr>
+          <p:cNvPr id="2" name="Title 1"/>
+          <p:cNvSpPr>
+            <a:spLocks noGrp="1"/>
+          </p:cNvSpPr>
+          <p:nvPr>
+            <p:ph type="title"/>
+          </p:nvPr>
+        </p:nvSpPr>
+        <p:spPr/>
+        <p:txBody>
+          <a:bodyPr/>
+          <a:lstStyle/>
+          <a:p>
+            <a:r>
+              <a:rPr lang="en-US" dirty="0" smtClean="0"/>
               <a:t>Recommendations</a:t>
             </a:r>
             <a:endParaRPr lang="en-US" dirty="0"/>
@@ -3889,7 +4151,11 @@
             </a:pPr>
             <a:r>
               <a:rPr lang="en-US" dirty="0" smtClean="0"/>
-              <a:t>Verify tickets during release cycle (change workflow?)</a:t>
+              <a:t>Verify tickets during release </a:t>
+            </a:r>
+            <a:r>
+              <a:rPr lang="en-US" dirty="0" smtClean="0"/>
+              <a:t>cycle</a:t>
             </a:r>
             <a:endParaRPr lang="en-US" dirty="0"/>
           </a:p>
@@ -3908,7 +4174,7 @@
 </p:sld>
 </file>
 
-<file path=ppt/slides/slide16.xml><?xml version="1.0" encoding="utf-8"?>
+<file path=ppt/slides/slide18.xml><?xml version="1.0" encoding="utf-8"?>
 <p:sld xmlns:a="http://schemas.openxmlformats.org/drawingml/2006/main" xmlns:r="http://schemas.openxmlformats.org/officeDocument/2006/relationships" xmlns:p="http://schemas.openxmlformats.org/presentationml/2006/main">
   <p:cSld>
     <p:spTree>

</xml_diff>